<commit_message>
updated dynamohelper to get params from dynamo scan
</commit_message>
<xml_diff>
--- a/docs/arch.pptx
+++ b/docs/arch.pptx
@@ -4360,7 +4360,7 @@
           <p:nvPr>
             <p:extLst>
               <p:ext uri="{D42A27DB-BD31-4B8C-83A1-F6EECF244321}">
-                <p14:modId xmlns:p14="http://schemas.microsoft.com/office/powerpoint/2010/main" val="236832759"/>
+                <p14:modId xmlns:p14="http://schemas.microsoft.com/office/powerpoint/2010/main" val="461443263"/>
               </p:ext>
             </p:extLst>
           </p:nvPr>
@@ -4588,15 +4588,7 @@
                       </a:r>
                       <a:r>
                         <a:rPr lang="en-US" baseline="0" dirty="0" smtClean="0"/>
-                        <a:t> starts Code Pipeline, writes </a:t>
-                      </a:r>
-                      <a:r>
-                        <a:rPr lang="en-US" baseline="0" dirty="0" err="1" smtClean="0"/>
-                        <a:t>resuilts</a:t>
-                      </a:r>
-                      <a:r>
-                        <a:rPr lang="en-US" baseline="0" dirty="0" smtClean="0"/>
-                        <a:t> to Dynamo</a:t>
+                        <a:t> starts Code Pipeline, writes results to Dynamo</a:t>
                       </a:r>
                     </a:p>
                     <a:p>

</xml_diff>

<commit_message>
cleanup of alexa skill
</commit_message>
<xml_diff>
--- a/docs/arch.pptx
+++ b/docs/arch.pptx
@@ -4884,7 +4884,7 @@
         <p:spPr>
           <a:xfrm>
             <a:off x="2721430" y="3907971"/>
-            <a:ext cx="3158172" cy="738664"/>
+            <a:ext cx="2571858" cy="738664"/>
           </a:xfrm>
           <a:prstGeom prst="rect">
             <a:avLst/>
@@ -4926,7 +4926,7 @@
             </a:r>
             <a:r>
               <a:rPr lang="en-US" sz="1400" dirty="0" smtClean="0"/>
-              <a:t> for last record(get last)</a:t>
+              <a:t> for last record</a:t>
             </a:r>
           </a:p>
           <a:p>
@@ -5516,7 +5516,7 @@
               <a:buChar char="•"/>
             </a:pPr>
             <a:r>
-              <a:rPr lang="en-US" sz="1400" smtClean="0"/>
+              <a:rPr lang="en-US" sz="1400" dirty="0" smtClean="0"/>
               <a:t>Just sets light Green</a:t>
             </a:r>
             <a:endParaRPr lang="en-US" sz="1400" dirty="0"/>

</xml_diff>

<commit_message>
foundation for mocha/chai framework
</commit_message>
<xml_diff>
--- a/docs/arch.pptx
+++ b/docs/arch.pptx
@@ -244,7 +244,7 @@
           <a:p>
             <a:fld id="{D04BC1F2-B5A6-AD47-B21D-687D59837D24}" type="datetimeFigureOut">
               <a:rPr lang="en-US" smtClean="0"/>
-              <a:t>6/3/16</a:t>
+              <a:t>6/13/16</a:t>
             </a:fld>
             <a:endParaRPr lang="en-US"/>
           </a:p>
@@ -414,7 +414,7 @@
           <a:p>
             <a:fld id="{D04BC1F2-B5A6-AD47-B21D-687D59837D24}" type="datetimeFigureOut">
               <a:rPr lang="en-US" smtClean="0"/>
-              <a:t>6/3/16</a:t>
+              <a:t>6/13/16</a:t>
             </a:fld>
             <a:endParaRPr lang="en-US"/>
           </a:p>
@@ -594,7 +594,7 @@
           <a:p>
             <a:fld id="{D04BC1F2-B5A6-AD47-B21D-687D59837D24}" type="datetimeFigureOut">
               <a:rPr lang="en-US" smtClean="0"/>
-              <a:t>6/3/16</a:t>
+              <a:t>6/13/16</a:t>
             </a:fld>
             <a:endParaRPr lang="en-US"/>
           </a:p>
@@ -764,7 +764,7 @@
           <a:p>
             <a:fld id="{D04BC1F2-B5A6-AD47-B21D-687D59837D24}" type="datetimeFigureOut">
               <a:rPr lang="en-US" smtClean="0"/>
-              <a:t>6/3/16</a:t>
+              <a:t>6/13/16</a:t>
             </a:fld>
             <a:endParaRPr lang="en-US"/>
           </a:p>
@@ -1010,7 +1010,7 @@
           <a:p>
             <a:fld id="{D04BC1F2-B5A6-AD47-B21D-687D59837D24}" type="datetimeFigureOut">
               <a:rPr lang="en-US" smtClean="0"/>
-              <a:t>6/3/16</a:t>
+              <a:t>6/13/16</a:t>
             </a:fld>
             <a:endParaRPr lang="en-US"/>
           </a:p>
@@ -1242,7 +1242,7 @@
           <a:p>
             <a:fld id="{D04BC1F2-B5A6-AD47-B21D-687D59837D24}" type="datetimeFigureOut">
               <a:rPr lang="en-US" smtClean="0"/>
-              <a:t>6/3/16</a:t>
+              <a:t>6/13/16</a:t>
             </a:fld>
             <a:endParaRPr lang="en-US"/>
           </a:p>
@@ -1609,7 +1609,7 @@
           <a:p>
             <a:fld id="{D04BC1F2-B5A6-AD47-B21D-687D59837D24}" type="datetimeFigureOut">
               <a:rPr lang="en-US" smtClean="0"/>
-              <a:t>6/3/16</a:t>
+              <a:t>6/13/16</a:t>
             </a:fld>
             <a:endParaRPr lang="en-US"/>
           </a:p>
@@ -1727,7 +1727,7 @@
           <a:p>
             <a:fld id="{D04BC1F2-B5A6-AD47-B21D-687D59837D24}" type="datetimeFigureOut">
               <a:rPr lang="en-US" smtClean="0"/>
-              <a:t>6/3/16</a:t>
+              <a:t>6/13/16</a:t>
             </a:fld>
             <a:endParaRPr lang="en-US"/>
           </a:p>
@@ -1822,7 +1822,7 @@
           <a:p>
             <a:fld id="{D04BC1F2-B5A6-AD47-B21D-687D59837D24}" type="datetimeFigureOut">
               <a:rPr lang="en-US" smtClean="0"/>
-              <a:t>6/3/16</a:t>
+              <a:t>6/13/16</a:t>
             </a:fld>
             <a:endParaRPr lang="en-US"/>
           </a:p>
@@ -2099,7 +2099,7 @@
           <a:p>
             <a:fld id="{D04BC1F2-B5A6-AD47-B21D-687D59837D24}" type="datetimeFigureOut">
               <a:rPr lang="en-US" smtClean="0"/>
-              <a:t>6/3/16</a:t>
+              <a:t>6/13/16</a:t>
             </a:fld>
             <a:endParaRPr lang="en-US"/>
           </a:p>
@@ -2352,7 +2352,7 @@
           <a:p>
             <a:fld id="{D04BC1F2-B5A6-AD47-B21D-687D59837D24}" type="datetimeFigureOut">
               <a:rPr lang="en-US" smtClean="0"/>
-              <a:t>6/3/16</a:t>
+              <a:t>6/13/16</a:t>
             </a:fld>
             <a:endParaRPr lang="en-US"/>
           </a:p>
@@ -2565,7 +2565,7 @@
           <a:p>
             <a:fld id="{D04BC1F2-B5A6-AD47-B21D-687D59837D24}" type="datetimeFigureOut">
               <a:rPr lang="en-US" smtClean="0"/>
-              <a:t>6/3/16</a:t>
+              <a:t>6/13/16</a:t>
             </a:fld>
             <a:endParaRPr lang="en-US"/>
           </a:p>
@@ -3038,8 +3038,8 @@
         </p:nvSpPr>
         <p:spPr>
           <a:xfrm>
-            <a:off x="2780270" y="1175822"/>
-            <a:ext cx="7080422" cy="2963306"/>
+            <a:off x="2780270" y="606287"/>
+            <a:ext cx="7080422" cy="3532841"/>
           </a:xfrm>
           <a:prstGeom prst="cloud">
             <a:avLst/>
@@ -3188,7 +3188,7 @@
         </p:blipFill>
         <p:spPr>
           <a:xfrm>
-            <a:off x="7983600" y="938494"/>
+            <a:off x="8079185" y="3212595"/>
             <a:ext cx="731520" cy="731520"/>
           </a:xfrm>
           <a:prstGeom prst="rect">
@@ -4730,6 +4730,123 @@
           </a:graphicData>
         </a:graphic>
       </p:graphicFrame>
+      <p:pic>
+        <p:nvPicPr>
+          <p:cNvPr id="42" name="Picture 41"/>
+          <p:cNvPicPr>
+            <a:picLocks noChangeAspect="1"/>
+          </p:cNvPicPr>
+          <p:nvPr/>
+        </p:nvPicPr>
+        <p:blipFill>
+          <a:blip r:embed="rId12">
+            <a:extLst>
+              <a:ext uri="{28A0092B-C50C-407E-A947-70E740481C1C}">
+                <a14:useLocalDpi xmlns:a14="http://schemas.microsoft.com/office/drawing/2010/main" val="0"/>
+              </a:ext>
+            </a:extLst>
+          </a:blip>
+          <a:stretch>
+            <a:fillRect/>
+          </a:stretch>
+        </p:blipFill>
+        <p:spPr>
+          <a:xfrm>
+            <a:off x="8799649" y="483851"/>
+            <a:ext cx="521367" cy="625640"/>
+          </a:xfrm>
+          <a:prstGeom prst="rect">
+            <a:avLst/>
+          </a:prstGeom>
+        </p:spPr>
+      </p:pic>
+      <p:sp>
+        <p:nvSpPr>
+          <p:cNvPr id="43" name="TextBox 42"/>
+          <p:cNvSpPr txBox="1"/>
+          <p:nvPr/>
+        </p:nvSpPr>
+        <p:spPr>
+          <a:xfrm>
+            <a:off x="8612448" y="1154650"/>
+            <a:ext cx="894752" cy="155632"/>
+          </a:xfrm>
+          <a:prstGeom prst="rect">
+            <a:avLst/>
+          </a:prstGeom>
+          <a:noFill/>
+        </p:spPr>
+        <p:txBody>
+          <a:bodyPr wrap="square" lIns="0" tIns="0" rIns="0" bIns="0" rtlCol="0" anchor="t">
+            <a:noAutofit/>
+          </a:bodyPr>
+          <a:lstStyle/>
+          <a:p>
+            <a:pPr algn="ctr"/>
+            <a:r>
+              <a:rPr lang="en-US" sz="1000" b="1" dirty="0" smtClean="0"/>
+              <a:t>Amazon API Gateway</a:t>
+            </a:r>
+            <a:endParaRPr lang="en-US" b="1" dirty="0"/>
+          </a:p>
+        </p:txBody>
+      </p:sp>
+      <p:sp>
+        <p:nvSpPr>
+          <p:cNvPr id="46" name="Isosceles Triangle 50"/>
+          <p:cNvSpPr>
+            <a:spLocks noChangeAspect="1"/>
+          </p:cNvSpPr>
+          <p:nvPr/>
+        </p:nvSpPr>
+        <p:spPr>
+          <a:xfrm>
+            <a:off x="8827399" y="1452267"/>
+            <a:ext cx="511942" cy="305579"/>
+          </a:xfrm>
+          <a:prstGeom prst="triangle">
+            <a:avLst/>
+          </a:prstGeom>
+          <a:solidFill>
+            <a:schemeClr val="accent5">
+              <a:lumMod val="50000"/>
+            </a:schemeClr>
+          </a:solidFill>
+          <a:ln>
+            <a:solidFill>
+              <a:schemeClr val="accent5">
+                <a:lumMod val="50000"/>
+              </a:schemeClr>
+            </a:solidFill>
+          </a:ln>
+        </p:spPr>
+        <p:style>
+          <a:lnRef idx="1">
+            <a:schemeClr val="accent1"/>
+          </a:lnRef>
+          <a:fillRef idx="3">
+            <a:schemeClr val="accent1"/>
+          </a:fillRef>
+          <a:effectRef idx="2">
+            <a:schemeClr val="accent1"/>
+          </a:effectRef>
+          <a:fontRef idx="minor">
+            <a:schemeClr val="lt1"/>
+          </a:fontRef>
+        </p:style>
+        <p:txBody>
+          <a:bodyPr rtlCol="0" anchor="ctr"/>
+          <a:lstStyle/>
+          <a:p>
+            <a:pPr algn="ctr"/>
+            <a:endParaRPr lang="en-US">
+              <a:solidFill>
+                <a:prstClr val="white"/>
+              </a:solidFill>
+            </a:endParaRPr>
+          </a:p>
+        </p:txBody>
+      </p:sp>
     </p:spTree>
     <p:extLst>
       <p:ext uri="{BB962C8B-B14F-4D97-AF65-F5344CB8AC3E}">

</xml_diff>